<commit_message>
review2 and review3 lecture
</commit_message>
<xml_diff>
--- a/courses/theory/slides/lec08-predlogic.pptx
+++ b/courses/theory/slides/lec08-predlogic.pptx
@@ -13404,8 +13404,8 @@
           </a:fontRef>
         </p:style>
       </p:cxnSp>
-      <mc:AlternateContent xmlns:mc="http://schemas.openxmlformats.org/markup-compatibility/2006">
-        <mc:Choice xmlns:a14="http://schemas.microsoft.com/office/drawing/2010/main" Requires="a14">
+      <mc:AlternateContent xmlns:mc="http://schemas.openxmlformats.org/markup-compatibility/2006" xmlns:a14="http://schemas.microsoft.com/office/drawing/2010/main">
+        <mc:Choice Requires="a14">
           <p:sp>
             <p:nvSpPr>
               <p:cNvPr id="14" name="文本框 13">
@@ -13477,7 +13477,7 @@
             </p:txBody>
           </p:sp>
         </mc:Choice>
-        <mc:Fallback>
+        <mc:Fallback xmlns="">
           <p:sp>
             <p:nvSpPr>
               <p:cNvPr id="14" name="文本框 13">
@@ -13522,8 +13522,8 @@
           </p:sp>
         </mc:Fallback>
       </mc:AlternateContent>
-      <mc:AlternateContent xmlns:mc="http://schemas.openxmlformats.org/markup-compatibility/2006">
-        <mc:Choice xmlns:a14="http://schemas.microsoft.com/office/drawing/2010/main" Requires="a14">
+      <mc:AlternateContent xmlns:mc="http://schemas.openxmlformats.org/markup-compatibility/2006" xmlns:a14="http://schemas.microsoft.com/office/drawing/2010/main">
+        <mc:Choice Requires="a14">
           <p:sp>
             <p:nvSpPr>
               <p:cNvPr id="16" name="文本框 15">
@@ -13593,7 +13593,7 @@
             </p:txBody>
           </p:sp>
         </mc:Choice>
-        <mc:Fallback>
+        <mc:Fallback xmlns="">
           <p:sp>
             <p:nvSpPr>
               <p:cNvPr id="16" name="文本框 15">
@@ -14122,8 +14122,8 @@
           </p:sp>
         </mc:Fallback>
       </mc:AlternateContent>
-      <mc:AlternateContent xmlns:mc="http://schemas.openxmlformats.org/markup-compatibility/2006">
-        <mc:Choice xmlns:a14="http://schemas.microsoft.com/office/drawing/2010/main" Requires="a14">
+      <mc:AlternateContent xmlns:mc="http://schemas.openxmlformats.org/markup-compatibility/2006" xmlns:a14="http://schemas.microsoft.com/office/drawing/2010/main">
+        <mc:Choice Requires="a14">
           <p:sp>
             <p:nvSpPr>
               <p:cNvPr id="20" name="文本框 19">
@@ -14350,7 +14350,7 @@
             </p:txBody>
           </p:sp>
         </mc:Choice>
-        <mc:Fallback>
+        <mc:Fallback xmlns="">
           <p:sp>
             <p:nvSpPr>
               <p:cNvPr id="20" name="文本框 19">
@@ -15470,8 +15470,8 @@
           </a:fontRef>
         </p:style>
       </p:cxnSp>
-      <mc:AlternateContent xmlns:mc="http://schemas.openxmlformats.org/markup-compatibility/2006">
-        <mc:Choice xmlns:a14="http://schemas.microsoft.com/office/drawing/2010/main" Requires="a14">
+      <mc:AlternateContent xmlns:mc="http://schemas.openxmlformats.org/markup-compatibility/2006" xmlns:a14="http://schemas.microsoft.com/office/drawing/2010/main">
+        <mc:Choice Requires="a14">
           <p:sp>
             <p:nvSpPr>
               <p:cNvPr id="35" name="文本框 34">
@@ -15543,7 +15543,7 @@
             </p:txBody>
           </p:sp>
         </mc:Choice>
-        <mc:Fallback>
+        <mc:Fallback xmlns="">
           <p:sp>
             <p:nvSpPr>
               <p:cNvPr id="35" name="文本框 34">
@@ -15588,8 +15588,8 @@
           </p:sp>
         </mc:Fallback>
       </mc:AlternateContent>
-      <mc:AlternateContent xmlns:mc="http://schemas.openxmlformats.org/markup-compatibility/2006">
-        <mc:Choice xmlns:a14="http://schemas.microsoft.com/office/drawing/2010/main" Requires="a14">
+      <mc:AlternateContent xmlns:mc="http://schemas.openxmlformats.org/markup-compatibility/2006" xmlns:a14="http://schemas.microsoft.com/office/drawing/2010/main">
+        <mc:Choice Requires="a14">
           <p:sp>
             <p:nvSpPr>
               <p:cNvPr id="37" name="文本框 36">
@@ -15661,7 +15661,7 @@
             </p:txBody>
           </p:sp>
         </mc:Choice>
-        <mc:Fallback>
+        <mc:Fallback xmlns="">
           <p:sp>
             <p:nvSpPr>
               <p:cNvPr id="37" name="文本框 36">
@@ -15706,8 +15706,8 @@
           </p:sp>
         </mc:Fallback>
       </mc:AlternateContent>
-      <mc:AlternateContent xmlns:mc="http://schemas.openxmlformats.org/markup-compatibility/2006">
-        <mc:Choice xmlns:a14="http://schemas.microsoft.com/office/drawing/2010/main" Requires="a14">
+      <mc:AlternateContent xmlns:mc="http://schemas.openxmlformats.org/markup-compatibility/2006" xmlns:a14="http://schemas.microsoft.com/office/drawing/2010/main">
+        <mc:Choice Requires="a14">
           <p:sp>
             <p:nvSpPr>
               <p:cNvPr id="38" name="文本框 37">
@@ -15942,7 +15942,7 @@
             </p:txBody>
           </p:sp>
         </mc:Choice>
-        <mc:Fallback>
+        <mc:Fallback xmlns="">
           <p:sp>
             <p:nvSpPr>
               <p:cNvPr id="38" name="文本框 37">
@@ -15987,8 +15987,8 @@
           </p:sp>
         </mc:Fallback>
       </mc:AlternateContent>
-      <mc:AlternateContent xmlns:mc="http://schemas.openxmlformats.org/markup-compatibility/2006">
-        <mc:Choice xmlns:a14="http://schemas.microsoft.com/office/drawing/2010/main" Requires="a14">
+      <mc:AlternateContent xmlns:mc="http://schemas.openxmlformats.org/markup-compatibility/2006" xmlns:a14="http://schemas.microsoft.com/office/drawing/2010/main">
+        <mc:Choice Requires="a14">
           <p:sp>
             <p:nvSpPr>
               <p:cNvPr id="39" name="文本框 38">
@@ -16053,7 +16053,7 @@
             </p:txBody>
           </p:sp>
         </mc:Choice>
-        <mc:Fallback>
+        <mc:Fallback xmlns="">
           <p:sp>
             <p:nvSpPr>
               <p:cNvPr id="39" name="文本框 38">
@@ -28974,8 +28974,8 @@
           </p:sp>
         </mc:Fallback>
       </mc:AlternateContent>
-      <mc:AlternateContent xmlns:mc="http://schemas.openxmlformats.org/markup-compatibility/2006" xmlns:a14="http://schemas.microsoft.com/office/drawing/2010/main">
-        <mc:Choice Requires="a14">
+      <mc:AlternateContent xmlns:mc="http://schemas.openxmlformats.org/markup-compatibility/2006">
+        <mc:Choice xmlns:a14="http://schemas.microsoft.com/office/drawing/2010/main" Requires="a14">
           <p:sp>
             <p:nvSpPr>
               <p:cNvPr id="19" name="内容占位符 2">
@@ -28992,7 +28992,7 @@
             </p:nvSpPr>
             <p:spPr bwMode="auto">
               <a:xfrm>
-                <a:off x="5145088" y="1981200"/>
+                <a:off x="5145954" y="1905000"/>
                 <a:ext cx="3770312" cy="4114800"/>
               </a:xfrm>
               <a:prstGeom prst="rect">
@@ -29776,7 +29776,7 @@
             </p:txBody>
           </p:sp>
         </mc:Choice>
-        <mc:Fallback xmlns="">
+        <mc:Fallback>
           <p:sp>
             <p:nvSpPr>
               <p:cNvPr id="19" name="内容占位符 2">
@@ -29793,7 +29793,7 @@
             </p:nvSpPr>
             <p:spPr bwMode="auto">
               <a:xfrm>
-                <a:off x="5145088" y="1981200"/>
+                <a:off x="5145954" y="1905000"/>
                 <a:ext cx="3770312" cy="4114800"/>
               </a:xfrm>
               <a:prstGeom prst="rect">
@@ -29802,7 +29802,7 @@
               <a:blipFill>
                 <a:blip r:embed="rId3"/>
                 <a:stretch>
-                  <a:fillRect l="-2349" t="-1235" b="-15741"/>
+                  <a:fillRect l="-2685" t="-1538" b="-15692"/>
                 </a:stretch>
               </a:blipFill>
               <a:ln>

</xml_diff>